<commit_message>
correção selenium + slide
</commit_message>
<xml_diff>
--- a/DrinkIt.WebApp/Artifacts/Apresentação TG - Drink-IT - Gabriel Lima - Gustavo da Rosa.pptx
+++ b/DrinkIt.WebApp/Artifacts/Apresentação TG - Drink-IT - Gabriel Lima - Gustavo da Rosa.pptx
@@ -7082,7 +7082,7 @@
         </p:spPr>
         <p:txBody>
           <a:bodyPr>
-            <a:normAutofit fontScale="92500" lnSpcReduction="10000"/>
+            <a:normAutofit fontScale="92500" lnSpcReduction="20000"/>
           </a:bodyPr>
           <a:lstStyle/>
           <a:p>
@@ -7108,6 +7108,11 @@
               <a:rPr lang="pt-BR" sz="1400" dirty="0"/>
               <a:t>Gustavo da Rosa – RA </a:t>
             </a:r>
+            <a:r>
+              <a:rPr lang="pt-BR" sz="1700" dirty="0"/>
+              <a:t>1840481613008</a:t>
+            </a:r>
+            <a:endParaRPr lang="pt-BR" sz="1400" dirty="0"/>
           </a:p>
           <a:p>
             <a:endParaRPr lang="pt-BR" sz="1400" dirty="0"/>

</xml_diff>